<commit_message>
Really the last one!
</commit_message>
<xml_diff>
--- a/Project 1 - Final Presentation.pptx
+++ b/Project 1 - Final Presentation.pptx
@@ -121,7 +121,7 @@
   </p:defaultTextStyle>
   <p:extLst>
     <p:ext uri="{EFAFB233-063F-42B5-8137-9DF3F51BA10A}">
-      <p15:sldGuideLst xmlns="" xmlns:p15="http://schemas.microsoft.com/office/powerpoint/2012/main">
+      <p15:sldGuideLst xmlns:p15="http://schemas.microsoft.com/office/powerpoint/2012/main" xmlns="">
         <p15:guide id="1" orient="horz" pos="2160">
           <p15:clr>
             <a:srgbClr val="A4A3A4"/>
@@ -5718,7 +5718,7 @@
           <p:cNvPr id="4" name="Picture 3">
             <a:extLst>
               <a:ext uri="{FF2B5EF4-FFF2-40B4-BE49-F238E27FC236}">
-                <a16:creationId xmlns="" xmlns:a16="http://schemas.microsoft.com/office/drawing/2014/main" id="{82A7E1B1-C2B9-4E3C-AF26-840FFD41F223}"/>
+                <a16:creationId xmlns:a16="http://schemas.microsoft.com/office/drawing/2014/main" xmlns="" id="{82A7E1B1-C2B9-4E3C-AF26-840FFD41F223}"/>
               </a:ext>
             </a:extLst>
           </p:cNvPr>
@@ -5753,7 +5753,7 @@
           <p:cNvPr id="5" name="Content Placeholder 19">
             <a:extLst>
               <a:ext uri="{FF2B5EF4-FFF2-40B4-BE49-F238E27FC236}">
-                <a16:creationId xmlns="" xmlns:a16="http://schemas.microsoft.com/office/drawing/2014/main" id="{C9FA707A-512A-4E07-980B-725D623F5594}"/>
+                <a16:creationId xmlns:a16="http://schemas.microsoft.com/office/drawing/2014/main" xmlns="" id="{C9FA707A-512A-4E07-980B-725D623F5594}"/>
               </a:ext>
             </a:extLst>
           </p:cNvPr>
@@ -5943,7 +5943,7 @@
           <p:cNvPr id="19" name="Picture 18" descr="A screenshot of a cell phone&#10;&#10;Description generated with very high confidence">
             <a:extLst>
               <a:ext uri="{FF2B5EF4-FFF2-40B4-BE49-F238E27FC236}">
-                <a16:creationId xmlns:a16="http://schemas.microsoft.com/office/drawing/2014/main" xmlns="" id="{3F5E5140-31D0-474F-835B-FB4052F1475D}"/>
+                <a16:creationId xmlns="" xmlns:a16="http://schemas.microsoft.com/office/drawing/2014/main" id="{3F5E5140-31D0-474F-835B-FB4052F1475D}"/>
               </a:ext>
             </a:extLst>
           </p:cNvPr>
@@ -5979,7 +5979,7 @@
           <p:cNvPr id="26" name="Picture 25">
             <a:extLst>
               <a:ext uri="{FF2B5EF4-FFF2-40B4-BE49-F238E27FC236}">
-                <a16:creationId xmlns:a16="http://schemas.microsoft.com/office/drawing/2014/main" xmlns="" id="{2C5F2125-AC5B-4716-AEFD-C80B7FED307E}"/>
+                <a16:creationId xmlns="" xmlns:a16="http://schemas.microsoft.com/office/drawing/2014/main" id="{2C5F2125-AC5B-4716-AEFD-C80B7FED307E}"/>
               </a:ext>
             </a:extLst>
           </p:cNvPr>
@@ -6015,7 +6015,7 @@
           <p:cNvPr id="30" name="Picture 29">
             <a:extLst>
               <a:ext uri="{FF2B5EF4-FFF2-40B4-BE49-F238E27FC236}">
-                <a16:creationId xmlns:a16="http://schemas.microsoft.com/office/drawing/2014/main" xmlns="" id="{9505DF59-96C0-4565-B666-B3C3030539D3}"/>
+                <a16:creationId xmlns="" xmlns:a16="http://schemas.microsoft.com/office/drawing/2014/main" id="{9505DF59-96C0-4565-B666-B3C3030539D3}"/>
               </a:ext>
             </a:extLst>
           </p:cNvPr>
@@ -6051,7 +6051,7 @@
           <p:cNvPr id="5" name="Picture 4" descr="A screenshot of a cell phone&#10;&#10;Description generated with very high confidence">
             <a:extLst>
               <a:ext uri="{FF2B5EF4-FFF2-40B4-BE49-F238E27FC236}">
-                <a16:creationId xmlns:a16="http://schemas.microsoft.com/office/drawing/2014/main" xmlns="" id="{BF93170C-30FE-49AA-9D4B-943D46BFA6DA}"/>
+                <a16:creationId xmlns="" xmlns:a16="http://schemas.microsoft.com/office/drawing/2014/main" id="{BF93170C-30FE-49AA-9D4B-943D46BFA6DA}"/>
               </a:ext>
             </a:extLst>
           </p:cNvPr>
@@ -6087,7 +6087,7 @@
           <p:cNvPr id="13" name="Picture 12" descr="A screenshot of a cell phone&#10;&#10;Description generated with very high confidence">
             <a:extLst>
               <a:ext uri="{FF2B5EF4-FFF2-40B4-BE49-F238E27FC236}">
-                <a16:creationId xmlns:a16="http://schemas.microsoft.com/office/drawing/2014/main" xmlns="" id="{57CD4B63-F3FC-4E4B-9BA0-3687006243F6}"/>
+                <a16:creationId xmlns="" xmlns:a16="http://schemas.microsoft.com/office/drawing/2014/main" id="{57CD4B63-F3FC-4E4B-9BA0-3687006243F6}"/>
               </a:ext>
             </a:extLst>
           </p:cNvPr>
@@ -6140,11 +6140,7 @@
           <a:p>
             <a:r>
               <a:rPr lang="en-US" sz="3200" dirty="0" smtClean="0"/>
-              <a:t>Top Five Traffic  Charges by </a:t>
-            </a:r>
-            <a:r>
-              <a:rPr lang="en-US" sz="3200" dirty="0" smtClean="0"/>
-              <a:t>Race and Gender</a:t>
+              <a:t>Top Five Traffic  Charges by Race and Gender</a:t>
             </a:r>
             <a:endParaRPr lang="en-US" sz="2800" dirty="0"/>
           </a:p>
@@ -7423,12 +7419,12 @@
               <a:t>Result DUI and percentage of violations </a:t>
             </a:r>
             <a:r>
-              <a:rPr lang="en-US" dirty="0" err="1">
+              <a:rPr lang="en-US" dirty="0" smtClean="0">
                 <a:solidFill>
                   <a:schemeClr val="bg1"/>
                 </a:solidFill>
               </a:rPr>
-              <a:t>vis</a:t>
+              <a:t>via </a:t>
             </a:r>
             <a:r>
               <a:rPr lang="en-US" dirty="0">
@@ -7436,7 +7432,7 @@
                   <a:schemeClr val="bg1"/>
                 </a:solidFill>
               </a:rPr>
-              <a:t> population Data Frame:</a:t>
+              <a:t>population Data Frame:</a:t>
             </a:r>
           </a:p>
         </p:txBody>
@@ -7811,11 +7807,19 @@
             <a:pPr lvl="1"/>
             <a:r>
               <a:rPr lang="en-US" dirty="0" err="1"/>
-              <a:t>cvs</a:t>
+              <a:t>c</a:t>
+            </a:r>
+            <a:r>
+              <a:rPr lang="en-US" dirty="0" err="1" smtClean="0"/>
+              <a:t>sv</a:t>
+            </a:r>
+            <a:r>
+              <a:rPr lang="en-US" dirty="0" smtClean="0"/>
+              <a:t> file </a:t>
             </a:r>
             <a:r>
               <a:rPr lang="en-US" dirty="0"/>
-              <a:t> file with </a:t>
+              <a:t>with </a:t>
             </a:r>
             <a:r>
               <a:rPr lang="en-US" dirty="0" smtClean="0"/>
@@ -8065,7 +8069,7 @@
           <p:cNvPr id="12" name="Picture 11">
             <a:extLst>
               <a:ext uri="{FF2B5EF4-FFF2-40B4-BE49-F238E27FC236}">
-                <a16:creationId xmlns="" xmlns:a16="http://schemas.microsoft.com/office/drawing/2014/main" id="{8084EAA1-734B-49E2-B165-CBD2A4CB094F}"/>
+                <a16:creationId xmlns:a16="http://schemas.microsoft.com/office/drawing/2014/main" xmlns="" id="{8084EAA1-734B-49E2-B165-CBD2A4CB094F}"/>
               </a:ext>
             </a:extLst>
           </p:cNvPr>
@@ -8288,7 +8292,7 @@
           <p:cNvPr id="12" name="Group 11">
             <a:extLst>
               <a:ext uri="{FF2B5EF4-FFF2-40B4-BE49-F238E27FC236}">
-                <a16:creationId xmlns="" xmlns:a16="http://schemas.microsoft.com/office/drawing/2014/main" id="{53DA2A78-ADF9-46F3-9463-218BD220B463}"/>
+                <a16:creationId xmlns:a16="http://schemas.microsoft.com/office/drawing/2014/main" xmlns="" id="{53DA2A78-ADF9-46F3-9463-218BD220B463}"/>
               </a:ext>
             </a:extLst>
           </p:cNvPr>
@@ -8308,7 +8312,7 @@
             <p:cNvPr id="13" name="Picture 12">
               <a:extLst>
                 <a:ext uri="{FF2B5EF4-FFF2-40B4-BE49-F238E27FC236}">
-                  <a16:creationId xmlns="" xmlns:a16="http://schemas.microsoft.com/office/drawing/2014/main" id="{830B94D3-2507-44D2-918A-BDC9555C19E3}"/>
+                  <a16:creationId xmlns:a16="http://schemas.microsoft.com/office/drawing/2014/main" xmlns="" id="{830B94D3-2507-44D2-918A-BDC9555C19E3}"/>
                 </a:ext>
               </a:extLst>
             </p:cNvPr>
@@ -8338,7 +8342,7 @@
             <p:cNvPr id="14" name="Picture 13">
               <a:extLst>
                 <a:ext uri="{FF2B5EF4-FFF2-40B4-BE49-F238E27FC236}">
-                  <a16:creationId xmlns="" xmlns:a16="http://schemas.microsoft.com/office/drawing/2014/main" id="{56506FA6-C0CC-4920-8FFB-ED363E797F8B}"/>
+                  <a16:creationId xmlns:a16="http://schemas.microsoft.com/office/drawing/2014/main" xmlns="" id="{56506FA6-C0CC-4920-8FFB-ED363E797F8B}"/>
                 </a:ext>
               </a:extLst>
             </p:cNvPr>
@@ -8512,7 +8516,7 @@
           <p:cNvPr id="19" name="Picture 18">
             <a:extLst>
               <a:ext uri="{FF2B5EF4-FFF2-40B4-BE49-F238E27FC236}">
-                <a16:creationId xmlns="" xmlns:a16="http://schemas.microsoft.com/office/drawing/2014/main" id="{40945382-1154-4543-BA9C-6C2E6968FFA8}"/>
+                <a16:creationId xmlns:a16="http://schemas.microsoft.com/office/drawing/2014/main" xmlns="" id="{40945382-1154-4543-BA9C-6C2E6968FFA8}"/>
               </a:ext>
             </a:extLst>
           </p:cNvPr>
@@ -8579,7 +8583,7 @@
           <p:cNvPr id="7" name="Picture 6">
             <a:extLst>
               <a:ext uri="{FF2B5EF4-FFF2-40B4-BE49-F238E27FC236}">
-                <a16:creationId xmlns:a16="http://schemas.microsoft.com/office/drawing/2014/main" xmlns="" id="{5427130F-47F8-4364-9E5E-A0CE441B7F13}"/>
+                <a16:creationId xmlns="" xmlns:a16="http://schemas.microsoft.com/office/drawing/2014/main" id="{5427130F-47F8-4364-9E5E-A0CE441B7F13}"/>
               </a:ext>
             </a:extLst>
           </p:cNvPr>
@@ -8784,7 +8788,7 @@
           <p:cNvPr id="4" name="Picture 3" descr="A screenshot of a cell phone&#10;&#10;Description generated with high confidence">
             <a:extLst>
               <a:ext uri="{FF2B5EF4-FFF2-40B4-BE49-F238E27FC236}">
-                <a16:creationId xmlns="" xmlns:a16="http://schemas.microsoft.com/office/drawing/2014/main" id="{EF84D726-1072-42E7-BB78-BADACAC6842E}"/>
+                <a16:creationId xmlns:a16="http://schemas.microsoft.com/office/drawing/2014/main" xmlns="" id="{EF84D726-1072-42E7-BB78-BADACAC6842E}"/>
               </a:ext>
             </a:extLst>
           </p:cNvPr>
@@ -8819,7 +8823,7 @@
           <p:cNvPr id="5" name="Picture 4">
             <a:extLst>
               <a:ext uri="{FF2B5EF4-FFF2-40B4-BE49-F238E27FC236}">
-                <a16:creationId xmlns="" xmlns:a16="http://schemas.microsoft.com/office/drawing/2014/main" id="{F48AF8C1-F70B-4D5E-A688-866B84A6AAC6}"/>
+                <a16:creationId xmlns:a16="http://schemas.microsoft.com/office/drawing/2014/main" xmlns="" id="{F48AF8C1-F70B-4D5E-A688-866B84A6AAC6}"/>
               </a:ext>
             </a:extLst>
           </p:cNvPr>
@@ -9036,7 +9040,7 @@
           <p:cNvPr id="9" name="Picture 8">
             <a:extLst>
               <a:ext uri="{FF2B5EF4-FFF2-40B4-BE49-F238E27FC236}">
-                <a16:creationId xmlns="" xmlns:a16="http://schemas.microsoft.com/office/drawing/2014/main" id="{031EC3CC-7A38-4142-9845-DC3C30FE4129}"/>
+                <a16:creationId xmlns:a16="http://schemas.microsoft.com/office/drawing/2014/main" xmlns="" id="{031EC3CC-7A38-4142-9845-DC3C30FE4129}"/>
               </a:ext>
             </a:extLst>
           </p:cNvPr>
@@ -9121,7 +9125,7 @@
           <p:cNvPr id="12" name="Picture 11">
             <a:extLst>
               <a:ext uri="{FF2B5EF4-FFF2-40B4-BE49-F238E27FC236}">
-                <a16:creationId xmlns="" xmlns:a16="http://schemas.microsoft.com/office/drawing/2014/main" id="{4D239A8D-5B94-4D62-B3FD-3781F4995431}"/>
+                <a16:creationId xmlns:a16="http://schemas.microsoft.com/office/drawing/2014/main" xmlns="" id="{4D239A8D-5B94-4D62-B3FD-3781F4995431}"/>
               </a:ext>
             </a:extLst>
           </p:cNvPr>

</xml_diff>